<commit_message>
Mise à jour des images du diaporama suite à la refonte du site
</commit_message>
<xml_diff>
--- a/P3_bikemaps.pptx
+++ b/P3_bikemaps.pptx
@@ -5,10 +5,10 @@
     <p:sldMasterId id="2147483648" r:id="rId4"/>
   </p:sldMasterIdLst>
   <p:notesMasterIdLst>
-    <p:notesMasterId r:id="rId13"/>
+    <p:notesMasterId r:id="rId15"/>
   </p:notesMasterIdLst>
   <p:handoutMasterIdLst>
-    <p:handoutMasterId r:id="rId14"/>
+    <p:handoutMasterId r:id="rId16"/>
   </p:handoutMasterIdLst>
   <p:sldIdLst>
     <p:sldId id="267" r:id="rId5"/>
@@ -16,9 +16,11 @@
     <p:sldId id="269" r:id="rId7"/>
     <p:sldId id="277" r:id="rId8"/>
     <p:sldId id="294" r:id="rId9"/>
-    <p:sldId id="286" r:id="rId10"/>
-    <p:sldId id="293" r:id="rId11"/>
-    <p:sldId id="272" r:id="rId12"/>
+    <p:sldId id="295" r:id="rId10"/>
+    <p:sldId id="296" r:id="rId11"/>
+    <p:sldId id="286" r:id="rId12"/>
+    <p:sldId id="293" r:id="rId13"/>
+    <p:sldId id="272" r:id="rId14"/>
   </p:sldIdLst>
   <p:sldSz cx="12192000" cy="6858000"/>
   <p:notesSz cx="6858000" cy="9144000"/>
@@ -223,7 +225,7 @@
             <a:pPr rtl="0"/>
             <a:fld id="{9D5BDD98-1DD8-4A62-ACBE-7B42D7F7964C}" type="datetime1">
               <a:rPr lang="fr-FR" smtClean="0"/>
-              <a:t>03/03/2021</a:t>
+              <a:t>23/03/2021</a:t>
             </a:fld>
             <a:endParaRPr lang="fr-FR" dirty="0"/>
           </a:p>
@@ -393,7 +395,7 @@
             <a:pPr rtl="0"/>
             <a:fld id="{90A438FC-7519-4FEE-9160-9BDC047A3078}" type="datetime1">
               <a:rPr lang="fr-FR" noProof="0" smtClean="0"/>
-              <a:t>03/03/2021</a:t>
+              <a:t>23/03/2021</a:t>
             </a:fld>
             <a:endParaRPr lang="fr-FR" noProof="0" dirty="0"/>
           </a:p>
@@ -749,6 +751,91 @@
 </p:notes>
 </file>
 
+<file path=ppt/notesSlides/notesSlide10.xml><?xml version="1.0" encoding="utf-8"?>
+<p:notes xmlns:a="http://schemas.openxmlformats.org/drawingml/2006/main" xmlns:r="http://schemas.openxmlformats.org/officeDocument/2006/relationships" xmlns:p="http://schemas.openxmlformats.org/presentationml/2006/main">
+  <p:cSld>
+    <p:spTree>
+      <p:nvGrpSpPr>
+        <p:cNvPr id="1" name=""/>
+        <p:cNvGrpSpPr/>
+        <p:nvPr/>
+      </p:nvGrpSpPr>
+      <p:grpSpPr>
+        <a:xfrm>
+          <a:off x="0" y="0"/>
+          <a:ext cx="0" cy="0"/>
+          <a:chOff x="0" y="0"/>
+          <a:chExt cx="0" cy="0"/>
+        </a:xfrm>
+      </p:grpSpPr>
+      <p:sp>
+        <p:nvSpPr>
+          <p:cNvPr id="2" name="Espace réservé de l'image des diapositives 1"/>
+          <p:cNvSpPr>
+            <a:spLocks noGrp="1" noRot="1" noChangeAspect="1"/>
+          </p:cNvSpPr>
+          <p:nvPr>
+            <p:ph type="sldImg"/>
+          </p:nvPr>
+        </p:nvSpPr>
+        <p:spPr/>
+      </p:sp>
+      <p:sp>
+        <p:nvSpPr>
+          <p:cNvPr id="3" name="Espace réservé des notes 2"/>
+          <p:cNvSpPr>
+            <a:spLocks noGrp="1"/>
+          </p:cNvSpPr>
+          <p:nvPr>
+            <p:ph type="body" idx="1"/>
+          </p:nvPr>
+        </p:nvSpPr>
+        <p:spPr/>
+        <p:txBody>
+          <a:bodyPr/>
+          <a:lstStyle/>
+          <a:p>
+            <a:endParaRPr lang="fr-FR" dirty="0"/>
+          </a:p>
+        </p:txBody>
+      </p:sp>
+      <p:sp>
+        <p:nvSpPr>
+          <p:cNvPr id="4" name="Espace réservé du numéro de diapositive 3"/>
+          <p:cNvSpPr>
+            <a:spLocks noGrp="1"/>
+          </p:cNvSpPr>
+          <p:nvPr>
+            <p:ph type="sldNum" sz="quarter" idx="10"/>
+          </p:nvPr>
+        </p:nvSpPr>
+        <p:spPr/>
+        <p:txBody>
+          <a:bodyPr/>
+          <a:lstStyle/>
+          <a:p>
+            <a:pPr rtl="0"/>
+            <a:fld id="{23AEF9EC-8318-4FF6-847E-A85BBD2B7E49}" type="slidenum">
+              <a:rPr lang="fr-FR" smtClean="0"/>
+              <a:t>10</a:t>
+            </a:fld>
+            <a:endParaRPr lang="fr-FR" dirty="0"/>
+          </a:p>
+        </p:txBody>
+      </p:sp>
+    </p:spTree>
+    <p:extLst>
+      <p:ext uri="{BB962C8B-B14F-4D97-AF65-F5344CB8AC3E}">
+        <p14:creationId xmlns:p14="http://schemas.microsoft.com/office/powerpoint/2010/main" val="2115273780"/>
+      </p:ext>
+    </p:extLst>
+  </p:cSld>
+  <p:clrMapOvr>
+    <a:masterClrMapping/>
+  </p:clrMapOvr>
+</p:notes>
+</file>
+
 <file path=ppt/notesSlides/notesSlide2.xml><?xml version="1.0" encoding="utf-8"?>
 <p:notes xmlns:a="http://schemas.openxmlformats.org/drawingml/2006/main" xmlns:r="http://schemas.openxmlformats.org/officeDocument/2006/relationships" xmlns:p="http://schemas.openxmlformats.org/presentationml/2006/main">
   <p:cSld>
@@ -1164,7 +1251,7 @@
     </p:spTree>
     <p:extLst>
       <p:ext uri="{BB962C8B-B14F-4D97-AF65-F5344CB8AC3E}">
-        <p14:creationId xmlns:p14="http://schemas.microsoft.com/office/powerpoint/2010/main" val="3767262774"/>
+        <p14:creationId xmlns:p14="http://schemas.microsoft.com/office/powerpoint/2010/main" val="1230618527"/>
       </p:ext>
     </p:extLst>
   </p:cSld>
@@ -1249,7 +1336,7 @@
     </p:spTree>
     <p:extLst>
       <p:ext uri="{BB962C8B-B14F-4D97-AF65-F5344CB8AC3E}">
-        <p14:creationId xmlns:p14="http://schemas.microsoft.com/office/powerpoint/2010/main" val="913220301"/>
+        <p14:creationId xmlns:p14="http://schemas.microsoft.com/office/powerpoint/2010/main" val="699431446"/>
       </p:ext>
     </p:extLst>
   </p:cSld>
@@ -1334,7 +1421,92 @@
     </p:spTree>
     <p:extLst>
       <p:ext uri="{BB962C8B-B14F-4D97-AF65-F5344CB8AC3E}">
-        <p14:creationId xmlns:p14="http://schemas.microsoft.com/office/powerpoint/2010/main" val="2115273780"/>
+        <p14:creationId xmlns:p14="http://schemas.microsoft.com/office/powerpoint/2010/main" val="3767262774"/>
+      </p:ext>
+    </p:extLst>
+  </p:cSld>
+  <p:clrMapOvr>
+    <a:masterClrMapping/>
+  </p:clrMapOvr>
+</p:notes>
+</file>
+
+<file path=ppt/notesSlides/notesSlide9.xml><?xml version="1.0" encoding="utf-8"?>
+<p:notes xmlns:a="http://schemas.openxmlformats.org/drawingml/2006/main" xmlns:r="http://schemas.openxmlformats.org/officeDocument/2006/relationships" xmlns:p="http://schemas.openxmlformats.org/presentationml/2006/main">
+  <p:cSld>
+    <p:spTree>
+      <p:nvGrpSpPr>
+        <p:cNvPr id="1" name=""/>
+        <p:cNvGrpSpPr/>
+        <p:nvPr/>
+      </p:nvGrpSpPr>
+      <p:grpSpPr>
+        <a:xfrm>
+          <a:off x="0" y="0"/>
+          <a:ext cx="0" cy="0"/>
+          <a:chOff x="0" y="0"/>
+          <a:chExt cx="0" cy="0"/>
+        </a:xfrm>
+      </p:grpSpPr>
+      <p:sp>
+        <p:nvSpPr>
+          <p:cNvPr id="2" name="Espace réservé de l'image des diapositives 1"/>
+          <p:cNvSpPr>
+            <a:spLocks noGrp="1" noRot="1" noChangeAspect="1"/>
+          </p:cNvSpPr>
+          <p:nvPr>
+            <p:ph type="sldImg"/>
+          </p:nvPr>
+        </p:nvSpPr>
+        <p:spPr/>
+      </p:sp>
+      <p:sp>
+        <p:nvSpPr>
+          <p:cNvPr id="3" name="Espace réservé des notes 2"/>
+          <p:cNvSpPr>
+            <a:spLocks noGrp="1"/>
+          </p:cNvSpPr>
+          <p:nvPr>
+            <p:ph type="body" idx="1"/>
+          </p:nvPr>
+        </p:nvSpPr>
+        <p:spPr/>
+        <p:txBody>
+          <a:bodyPr/>
+          <a:lstStyle/>
+          <a:p>
+            <a:endParaRPr lang="fr-FR" dirty="0"/>
+          </a:p>
+        </p:txBody>
+      </p:sp>
+      <p:sp>
+        <p:nvSpPr>
+          <p:cNvPr id="4" name="Espace réservé du numéro de diapositive 3"/>
+          <p:cNvSpPr>
+            <a:spLocks noGrp="1"/>
+          </p:cNvSpPr>
+          <p:nvPr>
+            <p:ph type="sldNum" sz="quarter" idx="10"/>
+          </p:nvPr>
+        </p:nvSpPr>
+        <p:spPr/>
+        <p:txBody>
+          <a:bodyPr/>
+          <a:lstStyle/>
+          <a:p>
+            <a:pPr rtl="0"/>
+            <a:fld id="{23AEF9EC-8318-4FF6-847E-A85BBD2B7E49}" type="slidenum">
+              <a:rPr lang="fr-FR" smtClean="0"/>
+              <a:t>9</a:t>
+            </a:fld>
+            <a:endParaRPr lang="fr-FR" dirty="0"/>
+          </a:p>
+        </p:txBody>
+      </p:sp>
+    </p:spTree>
+    <p:extLst>
+      <p:ext uri="{BB962C8B-B14F-4D97-AF65-F5344CB8AC3E}">
+        <p14:creationId xmlns:p14="http://schemas.microsoft.com/office/powerpoint/2010/main" val="913220301"/>
       </p:ext>
     </p:extLst>
   </p:cSld>
@@ -1649,7 +1821,7 @@
             <a:pPr rtl="0"/>
             <a:fld id="{5797B34A-87AE-4551-BA81-64A568712FD6}" type="datetime1">
               <a:rPr lang="fr-FR" noProof="0" smtClean="0"/>
-              <a:t>03/03/2021</a:t>
+              <a:t>23/03/2021</a:t>
             </a:fld>
             <a:endParaRPr lang="fr-FR" noProof="0" dirty="0"/>
           </a:p>
@@ -1852,7 +2024,7 @@
             <a:pPr rtl="0"/>
             <a:fld id="{F74F876D-7ED7-4DEF-8D41-A874DBAFFABE}" type="datetime1">
               <a:rPr lang="fr-FR" noProof="0" smtClean="0"/>
-              <a:t>03/03/2021</a:t>
+              <a:t>23/03/2021</a:t>
             </a:fld>
             <a:endParaRPr lang="fr-FR" noProof="0" dirty="0"/>
           </a:p>
@@ -2041,7 +2213,7 @@
             <a:pPr rtl="0"/>
             <a:fld id="{A03AC38D-2CF1-4E8C-83A4-9EF8868C4868}" type="datetime1">
               <a:rPr lang="fr-FR" noProof="0" smtClean="0"/>
-              <a:t>03/03/2021</a:t>
+              <a:t>23/03/2021</a:t>
             </a:fld>
             <a:endParaRPr lang="fr-FR" noProof="0" dirty="0"/>
           </a:p>
@@ -2271,7 +2443,7 @@
             <a:pPr rtl="0"/>
             <a:fld id="{665B0B46-974E-4163-A2B7-50173B8495DB}" type="datetime1">
               <a:rPr lang="fr-FR" noProof="0" smtClean="0"/>
-              <a:t>03/03/2021</a:t>
+              <a:t>23/03/2021</a:t>
             </a:fld>
             <a:endParaRPr lang="fr-FR" noProof="0" dirty="0"/>
           </a:p>
@@ -2582,7 +2754,7 @@
             <a:pPr rtl="0"/>
             <a:fld id="{514CD597-8C11-45A1-B8E8-E2AA8E08DA25}" type="datetime1">
               <a:rPr lang="fr-FR" noProof="0" smtClean="0"/>
-              <a:t>03/03/2021</a:t>
+              <a:t>23/03/2021</a:t>
             </a:fld>
             <a:endParaRPr lang="fr-FR" noProof="0" dirty="0"/>
           </a:p>
@@ -3041,7 +3213,7 @@
             <a:pPr rtl="0"/>
             <a:fld id="{6E2FB064-1154-498D-B361-160538AD7087}" type="datetime1">
               <a:rPr lang="fr-FR" noProof="0" smtClean="0"/>
-              <a:t>03/03/2021</a:t>
+              <a:t>23/03/2021</a:t>
             </a:fld>
             <a:endParaRPr lang="fr-FR" noProof="0" dirty="0"/>
           </a:p>
@@ -3178,7 +3350,7 @@
             <a:pPr rtl="0"/>
             <a:fld id="{63F67F20-A27B-42E3-97A4-4B013580047C}" type="datetime1">
               <a:rPr lang="fr-FR" noProof="0" smtClean="0"/>
-              <a:t>03/03/2021</a:t>
+              <a:t>23/03/2021</a:t>
             </a:fld>
             <a:endParaRPr lang="fr-FR" noProof="0" dirty="0"/>
           </a:p>
@@ -3305,7 +3477,7 @@
             <a:pPr rtl="0"/>
             <a:fld id="{DDFE37D5-A6FF-4444-B54D-FCBE77FED3BA}" type="datetime1">
               <a:rPr lang="fr-FR" noProof="0" smtClean="0"/>
-              <a:t>03/03/2021</a:t>
+              <a:t>23/03/2021</a:t>
             </a:fld>
             <a:endParaRPr lang="fr-FR" noProof="0" dirty="0"/>
           </a:p>
@@ -3666,7 +3838,7 @@
             <a:pPr rtl="0"/>
             <a:fld id="{C747054A-73C5-4730-B41A-9E5E45C9D6E0}" type="datetime1">
               <a:rPr lang="fr-FR" noProof="0" smtClean="0"/>
-              <a:t>03/03/2021</a:t>
+              <a:t>23/03/2021</a:t>
             </a:fld>
             <a:endParaRPr lang="fr-FR" noProof="0" dirty="0"/>
           </a:p>
@@ -4178,7 +4350,7 @@
             <a:pPr rtl="0"/>
             <a:fld id="{5B51B995-0424-474B-9684-35C2C1D93573}" type="datetime1">
               <a:rPr lang="fr-FR" noProof="0" smtClean="0"/>
-              <a:t>03/03/2021</a:t>
+              <a:t>23/03/2021</a:t>
             </a:fld>
             <a:endParaRPr lang="fr-FR" noProof="0" dirty="0"/>
           </a:p>
@@ -4614,18 +4786,19 @@
         </p:nvSpPr>
         <p:spPr>
           <a:xfrm>
-            <a:off x="464279" y="446081"/>
-            <a:ext cx="8226490" cy="3083767"/>
+            <a:off x="521944" y="196952"/>
+            <a:ext cx="11274640" cy="3083767"/>
           </a:xfrm>
         </p:spPr>
         <p:txBody>
           <a:bodyPr rtlCol="0">
-            <a:normAutofit fontScale="90000"/>
+            <a:normAutofit/>
           </a:bodyPr>
           <a:lstStyle/>
           <a:p>
-            <a:r>
-              <a:rPr lang="fr-FR" sz="8000" dirty="0"/>
+            <a:pPr algn="ctr"/>
+            <a:r>
+              <a:rPr lang="fr-FR" dirty="0"/>
               <a:t>Concevez une carte interactive de location de vélos</a:t>
             </a:r>
           </a:p>
@@ -4674,28 +4847,28 @@
       </p:sp>
       <p:pic>
         <p:nvPicPr>
-          <p:cNvPr id="3" name="Image 2"/>
+          <p:cNvPr id="5" name="Image 4">
+            <a:extLst>
+              <a:ext uri="{FF2B5EF4-FFF2-40B4-BE49-F238E27FC236}">
+                <a16:creationId xmlns:a16="http://schemas.microsoft.com/office/drawing/2014/main" id="{9E44EB69-B3F5-4E3C-9524-D7DB1F73A92D}"/>
+              </a:ext>
+            </a:extLst>
+          </p:cNvPr>
           <p:cNvPicPr>
             <a:picLocks noChangeAspect="1"/>
           </p:cNvPicPr>
           <p:nvPr/>
         </p:nvPicPr>
         <p:blipFill>
-          <a:blip r:embed="rId3">
-            <a:extLst>
-              <a:ext uri="{28A0092B-C50C-407E-A947-70E740481C1C}">
-                <a14:useLocalDpi xmlns:a14="http://schemas.microsoft.com/office/drawing/2010/main" val="0"/>
-              </a:ext>
-            </a:extLst>
-          </a:blip>
+          <a:blip r:embed="rId3"/>
           <a:stretch>
             <a:fillRect/>
           </a:stretch>
         </p:blipFill>
         <p:spPr>
           <a:xfrm>
-            <a:off x="5570896" y="3942885"/>
-            <a:ext cx="6239746" cy="1895740"/>
+            <a:off x="5268676" y="3429000"/>
+            <a:ext cx="1781175" cy="2228850"/>
           </a:xfrm>
           <a:prstGeom prst="rect">
             <a:avLst/>
@@ -4706,6 +4879,101 @@
     <p:extLst>
       <p:ext uri="{BB962C8B-B14F-4D97-AF65-F5344CB8AC3E}">
         <p14:creationId xmlns:p14="http://schemas.microsoft.com/office/powerpoint/2010/main" val="1051878143"/>
+      </p:ext>
+    </p:extLst>
+  </p:cSld>
+  <p:clrMapOvr>
+    <a:masterClrMapping/>
+  </p:clrMapOvr>
+  <mc:AlternateContent xmlns:mc="http://schemas.openxmlformats.org/markup-compatibility/2006" xmlns:p14="http://schemas.microsoft.com/office/powerpoint/2010/main">
+    <mc:Choice Requires="p14">
+      <p:transition spd="med" p14:dur="700">
+        <p:fade/>
+      </p:transition>
+    </mc:Choice>
+    <mc:Fallback xmlns="">
+      <p:transition spd="med">
+        <p:fade/>
+      </p:transition>
+    </mc:Fallback>
+  </mc:AlternateContent>
+</p:sld>
+</file>
+
+<file path=ppt/slides/slide10.xml><?xml version="1.0" encoding="utf-8"?>
+<p:sld xmlns:a="http://schemas.openxmlformats.org/drawingml/2006/main" xmlns:r="http://schemas.openxmlformats.org/officeDocument/2006/relationships" xmlns:p="http://schemas.openxmlformats.org/presentationml/2006/main">
+  <p:cSld>
+    <p:spTree>
+      <p:nvGrpSpPr>
+        <p:cNvPr id="1" name=""/>
+        <p:cNvGrpSpPr/>
+        <p:nvPr/>
+      </p:nvGrpSpPr>
+      <p:grpSpPr>
+        <a:xfrm>
+          <a:off x="0" y="0"/>
+          <a:ext cx="0" cy="0"/>
+          <a:chOff x="0" y="0"/>
+          <a:chExt cx="0" cy="0"/>
+        </a:xfrm>
+      </p:grpSpPr>
+      <p:sp>
+        <p:nvSpPr>
+          <p:cNvPr id="5" name="Titre 1"/>
+          <p:cNvSpPr txBox="1">
+            <a:spLocks/>
+          </p:cNvSpPr>
+          <p:nvPr/>
+        </p:nvSpPr>
+        <p:spPr>
+          <a:xfrm>
+            <a:off x="1766447" y="1061884"/>
+            <a:ext cx="8226490" cy="3083767"/>
+          </a:xfrm>
+          <a:prstGeom prst="rect">
+            <a:avLst/>
+          </a:prstGeom>
+        </p:spPr>
+        <p:txBody>
+          <a:bodyPr vert="horz" lIns="91440" tIns="45720" rIns="91440" bIns="45720" rtlCol="0" anchor="b">
+            <a:normAutofit/>
+          </a:bodyPr>
+          <a:lstStyle>
+            <a:lvl1pPr algn="l" defTabSz="914400" rtl="0" eaLnBrk="1" latinLnBrk="0" hangingPunct="1">
+              <a:lnSpc>
+                <a:spcPct val="90000"/>
+              </a:lnSpc>
+              <a:spcBef>
+                <a:spcPct val="0"/>
+              </a:spcBef>
+              <a:buNone/>
+              <a:defRPr sz="5400" kern="1200">
+                <a:solidFill>
+                  <a:schemeClr val="accent1"/>
+                </a:solidFill>
+                <a:latin typeface="+mj-lt"/>
+                <a:ea typeface="+mj-ea"/>
+                <a:cs typeface="+mj-cs"/>
+              </a:defRPr>
+            </a:lvl1pPr>
+          </a:lstStyle>
+          <a:p>
+            <a:pPr algn="ctr"/>
+            <a:r>
+              <a:rPr lang="fr-FR" sz="8000" dirty="0">
+                <a:solidFill>
+                  <a:schemeClr val="tx1"/>
+                </a:solidFill>
+              </a:rPr>
+              <a:t>Merci</a:t>
+            </a:r>
+          </a:p>
+        </p:txBody>
+      </p:sp>
+    </p:spTree>
+    <p:extLst>
+      <p:ext uri="{BB962C8B-B14F-4D97-AF65-F5344CB8AC3E}">
+        <p14:creationId xmlns:p14="http://schemas.microsoft.com/office/powerpoint/2010/main" val="3999759775"/>
       </p:ext>
     </p:extLst>
   </p:cSld>
@@ -4878,8 +5146,8 @@
         </p:nvSpPr>
         <p:spPr>
           <a:xfrm>
-            <a:off x="-101600" y="216310"/>
-            <a:ext cx="12409714" cy="658761"/>
+            <a:off x="0" y="216310"/>
+            <a:ext cx="12192000" cy="658761"/>
           </a:xfrm>
           <a:solidFill>
             <a:schemeClr val="bg1"/>
@@ -4898,7 +5166,7 @@
           <a:p>
             <a:r>
               <a:rPr lang="fr-FR" dirty="0"/>
-              <a:t>	1 _ Quel est le rôle d’un développeur front end ?</a:t>
+              <a:t>1 _ Quel est le rôle d’un développeur front end ?</a:t>
             </a:r>
           </a:p>
         </p:txBody>
@@ -5023,8 +5291,8 @@
         </p:nvSpPr>
         <p:spPr>
           <a:xfrm>
-            <a:off x="-130629" y="216310"/>
-            <a:ext cx="12438743" cy="924232"/>
+            <a:off x="0" y="216310"/>
+            <a:ext cx="12192000" cy="924232"/>
           </a:xfrm>
           <a:solidFill>
             <a:schemeClr val="bg1"/>
@@ -5044,10 +5312,6 @@
           <a:lstStyle/>
           <a:p>
             <a:r>
-              <a:rPr lang="fr-FR" dirty="0"/>
-              <a:t>	</a:t>
-            </a:r>
-            <a:r>
               <a:rPr lang="fr-FR" sz="3600" dirty="0"/>
               <a:t>2 _ En quoi mon projet répond bien au rôle du développeur 	front end.</a:t>
             </a:r>
@@ -5056,7 +5320,13 @@
       </p:sp>
       <p:pic>
         <p:nvPicPr>
-          <p:cNvPr id="3" name="Image 2"/>
+          <p:cNvPr id="5" name="Image 4">
+            <a:extLst>
+              <a:ext uri="{FF2B5EF4-FFF2-40B4-BE49-F238E27FC236}">
+                <a16:creationId xmlns:a16="http://schemas.microsoft.com/office/drawing/2014/main" id="{315E743E-7FBB-462E-9A33-EB49760A60ED}"/>
+              </a:ext>
+            </a:extLst>
+          </p:cNvPr>
           <p:cNvPicPr>
             <a:picLocks noChangeAspect="1"/>
           </p:cNvPicPr>
@@ -5070,8 +5340,8 @@
         </p:blipFill>
         <p:spPr>
           <a:xfrm>
-            <a:off x="1366259" y="1491599"/>
-            <a:ext cx="9444966" cy="5073694"/>
+            <a:off x="2602706" y="1347256"/>
+            <a:ext cx="6972072" cy="5197705"/>
           </a:xfrm>
           <a:prstGeom prst="rect">
             <a:avLst/>
@@ -5132,8 +5402,8 @@
         </p:nvSpPr>
         <p:spPr>
           <a:xfrm>
-            <a:off x="-130629" y="216310"/>
-            <a:ext cx="12438743" cy="924232"/>
+            <a:off x="0" y="216310"/>
+            <a:ext cx="12192000" cy="924232"/>
           </a:xfrm>
           <a:solidFill>
             <a:schemeClr val="bg1"/>
@@ -5153,10 +5423,6 @@
           <a:lstStyle/>
           <a:p>
             <a:r>
-              <a:rPr lang="fr-FR" dirty="0"/>
-              <a:t>	</a:t>
-            </a:r>
-            <a:r>
               <a:rPr lang="fr-FR" sz="3600" dirty="0"/>
               <a:t>2 _ En quoi mon projet répond bien au rôle du développeur 	front end.</a:t>
             </a:r>
@@ -5165,7 +5431,13 @@
       </p:sp>
       <p:pic>
         <p:nvPicPr>
-          <p:cNvPr id="4" name="Image 3"/>
+          <p:cNvPr id="5" name="Image 4">
+            <a:extLst>
+              <a:ext uri="{FF2B5EF4-FFF2-40B4-BE49-F238E27FC236}">
+                <a16:creationId xmlns:a16="http://schemas.microsoft.com/office/drawing/2014/main" id="{6339BDF0-20A6-4E8C-842B-FD195389F0F1}"/>
+              </a:ext>
+            </a:extLst>
+          </p:cNvPr>
           <p:cNvPicPr>
             <a:picLocks noChangeAspect="1"/>
           </p:cNvPicPr>
@@ -5179,8 +5451,8 @@
         </p:blipFill>
         <p:spPr>
           <a:xfrm>
-            <a:off x="1494549" y="1317073"/>
-            <a:ext cx="9188386" cy="5266226"/>
+            <a:off x="1610497" y="1452093"/>
+            <a:ext cx="8971005" cy="5037614"/>
           </a:xfrm>
           <a:prstGeom prst="rect">
             <a:avLst/>
@@ -5241,8 +5513,8 @@
         </p:nvSpPr>
         <p:spPr>
           <a:xfrm>
-            <a:off x="-130629" y="216310"/>
-            <a:ext cx="12438743" cy="924232"/>
+            <a:off x="0" y="216310"/>
+            <a:ext cx="12192000" cy="924232"/>
           </a:xfrm>
           <a:solidFill>
             <a:schemeClr val="bg1"/>
@@ -5262,9 +5534,227 @@
           <a:lstStyle/>
           <a:p>
             <a:r>
-              <a:rPr lang="fr-FR" dirty="0"/>
-              <a:t>	</a:t>
-            </a:r>
+              <a:rPr lang="fr-FR" sz="3600" dirty="0"/>
+              <a:t>2 _ En quoi mon projet répond bien au rôle du développeur 	front end.</a:t>
+            </a:r>
+          </a:p>
+        </p:txBody>
+      </p:sp>
+      <p:pic>
+        <p:nvPicPr>
+          <p:cNvPr id="4" name="Image 3">
+            <a:extLst>
+              <a:ext uri="{FF2B5EF4-FFF2-40B4-BE49-F238E27FC236}">
+                <a16:creationId xmlns:a16="http://schemas.microsoft.com/office/drawing/2014/main" id="{6B6990BC-1C50-4FB2-926E-7AE25C6483D3}"/>
+              </a:ext>
+            </a:extLst>
+          </p:cNvPr>
+          <p:cNvPicPr>
+            <a:picLocks noChangeAspect="1"/>
+          </p:cNvPicPr>
+          <p:nvPr/>
+        </p:nvPicPr>
+        <p:blipFill>
+          <a:blip r:embed="rId3"/>
+          <a:stretch>
+            <a:fillRect/>
+          </a:stretch>
+        </p:blipFill>
+        <p:spPr>
+          <a:xfrm>
+            <a:off x="1548132" y="1406544"/>
+            <a:ext cx="9095736" cy="5235146"/>
+          </a:xfrm>
+          <a:prstGeom prst="rect">
+            <a:avLst/>
+          </a:prstGeom>
+        </p:spPr>
+      </p:pic>
+    </p:spTree>
+    <p:extLst>
+      <p:ext uri="{BB962C8B-B14F-4D97-AF65-F5344CB8AC3E}">
+        <p14:creationId xmlns:p14="http://schemas.microsoft.com/office/powerpoint/2010/main" val="1944726838"/>
+      </p:ext>
+    </p:extLst>
+  </p:cSld>
+  <p:clrMapOvr>
+    <a:masterClrMapping/>
+  </p:clrMapOvr>
+  <mc:AlternateContent xmlns:mc="http://schemas.openxmlformats.org/markup-compatibility/2006">
+    <mc:Choice xmlns:p14="http://schemas.microsoft.com/office/powerpoint/2010/main" Requires="p14">
+      <p:transition spd="med" p14:dur="700">
+        <p:fade/>
+      </p:transition>
+    </mc:Choice>
+    <mc:Fallback>
+      <p:transition spd="med">
+        <p:fade/>
+      </p:transition>
+    </mc:Fallback>
+  </mc:AlternateContent>
+</p:sld>
+</file>
+
+<file path=ppt/slides/slide7.xml><?xml version="1.0" encoding="utf-8"?>
+<p:sld xmlns:a="http://schemas.openxmlformats.org/drawingml/2006/main" xmlns:r="http://schemas.openxmlformats.org/officeDocument/2006/relationships" xmlns:p="http://schemas.openxmlformats.org/presentationml/2006/main">
+  <p:cSld>
+    <p:spTree>
+      <p:nvGrpSpPr>
+        <p:cNvPr id="1" name=""/>
+        <p:cNvGrpSpPr/>
+        <p:nvPr/>
+      </p:nvGrpSpPr>
+      <p:grpSpPr>
+        <a:xfrm>
+          <a:off x="0" y="0"/>
+          <a:ext cx="0" cy="0"/>
+          <a:chOff x="0" y="0"/>
+          <a:chExt cx="0" cy="0"/>
+        </a:xfrm>
+      </p:grpSpPr>
+      <p:sp>
+        <p:nvSpPr>
+          <p:cNvPr id="2" name="Titre 1"/>
+          <p:cNvSpPr>
+            <a:spLocks noGrp="1"/>
+          </p:cNvSpPr>
+          <p:nvPr>
+            <p:ph type="title"/>
+          </p:nvPr>
+        </p:nvSpPr>
+        <p:spPr>
+          <a:xfrm>
+            <a:off x="0" y="216310"/>
+            <a:ext cx="12192000" cy="924232"/>
+          </a:xfrm>
+          <a:solidFill>
+            <a:schemeClr val="bg1"/>
+          </a:solidFill>
+          <a:ln w="19050">
+            <a:solidFill>
+              <a:schemeClr val="tx1">
+                <a:lumMod val="50000"/>
+              </a:schemeClr>
+            </a:solidFill>
+          </a:ln>
+        </p:spPr>
+        <p:txBody>
+          <a:bodyPr rtlCol="0">
+            <a:normAutofit fontScale="90000"/>
+          </a:bodyPr>
+          <a:lstStyle/>
+          <a:p>
+            <a:r>
+              <a:rPr lang="fr-FR" sz="3600" dirty="0"/>
+              <a:t>2 _ En quoi mon projet répond bien au rôle du développeur 	front end.</a:t>
+            </a:r>
+          </a:p>
+        </p:txBody>
+      </p:sp>
+      <p:pic>
+        <p:nvPicPr>
+          <p:cNvPr id="4" name="Image 3">
+            <a:extLst>
+              <a:ext uri="{FF2B5EF4-FFF2-40B4-BE49-F238E27FC236}">
+                <a16:creationId xmlns:a16="http://schemas.microsoft.com/office/drawing/2014/main" id="{EE39C5C5-4B2B-4894-AD8B-1F072989935F}"/>
+              </a:ext>
+            </a:extLst>
+          </p:cNvPr>
+          <p:cNvPicPr>
+            <a:picLocks noChangeAspect="1"/>
+          </p:cNvPicPr>
+          <p:nvPr/>
+        </p:nvPicPr>
+        <p:blipFill>
+          <a:blip r:embed="rId3"/>
+          <a:stretch>
+            <a:fillRect/>
+          </a:stretch>
+        </p:blipFill>
+        <p:spPr>
+          <a:xfrm>
+            <a:off x="1590671" y="1282977"/>
+            <a:ext cx="8996142" cy="5358713"/>
+          </a:xfrm>
+          <a:prstGeom prst="rect">
+            <a:avLst/>
+          </a:prstGeom>
+        </p:spPr>
+      </p:pic>
+    </p:spTree>
+    <p:extLst>
+      <p:ext uri="{BB962C8B-B14F-4D97-AF65-F5344CB8AC3E}">
+        <p14:creationId xmlns:p14="http://schemas.microsoft.com/office/powerpoint/2010/main" val="1227876752"/>
+      </p:ext>
+    </p:extLst>
+  </p:cSld>
+  <p:clrMapOvr>
+    <a:masterClrMapping/>
+  </p:clrMapOvr>
+  <mc:AlternateContent xmlns:mc="http://schemas.openxmlformats.org/markup-compatibility/2006">
+    <mc:Choice xmlns:p14="http://schemas.microsoft.com/office/powerpoint/2010/main" Requires="p14">
+      <p:transition spd="med" p14:dur="700">
+        <p:fade/>
+      </p:transition>
+    </mc:Choice>
+    <mc:Fallback>
+      <p:transition spd="med">
+        <p:fade/>
+      </p:transition>
+    </mc:Fallback>
+  </mc:AlternateContent>
+</p:sld>
+</file>
+
+<file path=ppt/slides/slide8.xml><?xml version="1.0" encoding="utf-8"?>
+<p:sld xmlns:a="http://schemas.openxmlformats.org/drawingml/2006/main" xmlns:r="http://schemas.openxmlformats.org/officeDocument/2006/relationships" xmlns:p="http://schemas.openxmlformats.org/presentationml/2006/main">
+  <p:cSld>
+    <p:spTree>
+      <p:nvGrpSpPr>
+        <p:cNvPr id="1" name=""/>
+        <p:cNvGrpSpPr/>
+        <p:nvPr/>
+      </p:nvGrpSpPr>
+      <p:grpSpPr>
+        <a:xfrm>
+          <a:off x="0" y="0"/>
+          <a:ext cx="0" cy="0"/>
+          <a:chOff x="0" y="0"/>
+          <a:chExt cx="0" cy="0"/>
+        </a:xfrm>
+      </p:grpSpPr>
+      <p:sp>
+        <p:nvSpPr>
+          <p:cNvPr id="2" name="Titre 1"/>
+          <p:cNvSpPr>
+            <a:spLocks noGrp="1"/>
+          </p:cNvSpPr>
+          <p:nvPr>
+            <p:ph type="title"/>
+          </p:nvPr>
+        </p:nvSpPr>
+        <p:spPr>
+          <a:xfrm>
+            <a:off x="0" y="216310"/>
+            <a:ext cx="12192000" cy="924232"/>
+          </a:xfrm>
+          <a:solidFill>
+            <a:schemeClr val="bg1"/>
+          </a:solidFill>
+          <a:ln w="19050">
+            <a:solidFill>
+              <a:schemeClr val="tx1">
+                <a:lumMod val="50000"/>
+              </a:schemeClr>
+            </a:solidFill>
+          </a:ln>
+        </p:spPr>
+        <p:txBody>
+          <a:bodyPr rtlCol="0">
+            <a:normAutofit fontScale="90000"/>
+          </a:bodyPr>
+          <a:lstStyle/>
+          <a:p>
             <a:r>
               <a:rPr lang="fr-FR" sz="3600" dirty="0"/>
               <a:t>3 _ Description des différentes techniques misent en place 	pour contrer les difficultés rencontrées.</a:t>
@@ -5297,7 +5787,7 @@
 </p:sld>
 </file>
 
-<file path=ppt/slides/slide7.xml><?xml version="1.0" encoding="utf-8"?>
+<file path=ppt/slides/slide9.xml><?xml version="1.0" encoding="utf-8"?>
 <p:sld xmlns:a="http://schemas.openxmlformats.org/drawingml/2006/main" xmlns:r="http://schemas.openxmlformats.org/officeDocument/2006/relationships" xmlns:p="http://schemas.openxmlformats.org/presentationml/2006/main">
   <p:cSld>
     <p:spTree>
@@ -5316,19 +5806,60 @@
       </p:grpSpPr>
       <p:sp>
         <p:nvSpPr>
-          <p:cNvPr id="2" name="Titre 1"/>
-          <p:cNvSpPr>
-            <a:spLocks noGrp="1"/>
-          </p:cNvSpPr>
-          <p:nvPr>
-            <p:ph type="title"/>
+          <p:cNvPr id="6" name="Espace réservé du contenu 2"/>
+          <p:cNvSpPr>
+            <a:spLocks noGrp="1"/>
+          </p:cNvSpPr>
+          <p:nvPr>
+            <p:ph idx="1"/>
           </p:nvPr>
         </p:nvSpPr>
         <p:spPr>
           <a:xfrm>
-            <a:off x="-130629" y="216310"/>
-            <a:ext cx="12438743" cy="924232"/>
+            <a:off x="363794" y="1686466"/>
+            <a:ext cx="11464412" cy="4348163"/>
           </a:xfrm>
+        </p:spPr>
+        <p:txBody>
+          <a:bodyPr rtlCol="0">
+            <a:normAutofit/>
+          </a:bodyPr>
+          <a:lstStyle/>
+          <a:p>
+            <a:pPr rtl="0"/>
+            <a:endParaRPr lang="fr-FR" sz="2800" dirty="0"/>
+          </a:p>
+          <a:p>
+            <a:pPr rtl="0"/>
+            <a:r>
+              <a:rPr lang="fr-FR" sz="2800" dirty="0"/>
+              <a:t>Mise en place de plusieurs pages pour améliorer le référencement.</a:t>
+            </a:r>
+          </a:p>
+        </p:txBody>
+      </p:sp>
+      <p:sp>
+        <p:nvSpPr>
+          <p:cNvPr id="4" name="Titre 1">
+            <a:extLst>
+              <a:ext uri="{FF2B5EF4-FFF2-40B4-BE49-F238E27FC236}">
+                <a16:creationId xmlns:a16="http://schemas.microsoft.com/office/drawing/2014/main" id="{637BACDF-5E89-4F1E-886D-F65F8BFD4B56}"/>
+              </a:ext>
+            </a:extLst>
+          </p:cNvPr>
+          <p:cNvSpPr txBox="1">
+            <a:spLocks/>
+          </p:cNvSpPr>
+          <p:nvPr/>
+        </p:nvSpPr>
+        <p:spPr>
+          <a:xfrm>
+            <a:off x="0" y="216310"/>
+            <a:ext cx="12192000" cy="924232"/>
+          </a:xfrm>
+          <a:prstGeom prst="rect">
+            <a:avLst/>
+          </a:prstGeom>
           <a:solidFill>
             <a:schemeClr val="bg1"/>
           </a:solidFill>
@@ -5341,114 +5872,8 @@
           </a:ln>
         </p:spPr>
         <p:txBody>
-          <a:bodyPr rtlCol="0">
-            <a:normAutofit fontScale="90000"/>
-          </a:bodyPr>
-          <a:lstStyle/>
-          <a:p>
-            <a:r>
-              <a:rPr lang="fr-FR" dirty="0"/>
-              <a:t>	4 _ Evolution de l’application selon mon propre cahier des 	charges.</a:t>
-            </a:r>
-          </a:p>
-        </p:txBody>
-      </p:sp>
-      <p:sp>
-        <p:nvSpPr>
-          <p:cNvPr id="6" name="Espace réservé du contenu 2"/>
-          <p:cNvSpPr>
-            <a:spLocks noGrp="1"/>
-          </p:cNvSpPr>
-          <p:nvPr>
-            <p:ph idx="1"/>
-          </p:nvPr>
-        </p:nvSpPr>
-        <p:spPr>
-          <a:xfrm>
-            <a:off x="363794" y="1686466"/>
-            <a:ext cx="11464412" cy="4348163"/>
-          </a:xfrm>
-        </p:spPr>
-        <p:txBody>
-          <a:bodyPr rtlCol="0">
-            <a:normAutofit/>
-          </a:bodyPr>
-          <a:lstStyle/>
-          <a:p>
-            <a:pPr rtl="0"/>
-            <a:endParaRPr lang="fr-FR" sz="2800" dirty="0"/>
-          </a:p>
-          <a:p>
-            <a:pPr rtl="0"/>
-            <a:r>
-              <a:rPr lang="fr-FR" sz="2800" dirty="0"/>
-              <a:t>Mise en place de plusieurs pages pour améliorer le référencement.</a:t>
-            </a:r>
-          </a:p>
-        </p:txBody>
-      </p:sp>
-    </p:spTree>
-    <p:extLst>
-      <p:ext uri="{BB962C8B-B14F-4D97-AF65-F5344CB8AC3E}">
-        <p14:creationId xmlns:p14="http://schemas.microsoft.com/office/powerpoint/2010/main" val="2288562025"/>
-      </p:ext>
-    </p:extLst>
-  </p:cSld>
-  <p:clrMapOvr>
-    <a:masterClrMapping/>
-  </p:clrMapOvr>
-  <mc:AlternateContent xmlns:mc="http://schemas.openxmlformats.org/markup-compatibility/2006" xmlns:p14="http://schemas.microsoft.com/office/powerpoint/2010/main">
-    <mc:Choice Requires="p14">
-      <p:transition spd="med" p14:dur="700">
-        <p:fade/>
-      </p:transition>
-    </mc:Choice>
-    <mc:Fallback xmlns="">
-      <p:transition spd="med">
-        <p:fade/>
-      </p:transition>
-    </mc:Fallback>
-  </mc:AlternateContent>
-</p:sld>
-</file>
-
-<file path=ppt/slides/slide8.xml><?xml version="1.0" encoding="utf-8"?>
-<p:sld xmlns:a="http://schemas.openxmlformats.org/drawingml/2006/main" xmlns:r="http://schemas.openxmlformats.org/officeDocument/2006/relationships" xmlns:p="http://schemas.openxmlformats.org/presentationml/2006/main">
-  <p:cSld>
-    <p:spTree>
-      <p:nvGrpSpPr>
-        <p:cNvPr id="1" name=""/>
-        <p:cNvGrpSpPr/>
-        <p:nvPr/>
-      </p:nvGrpSpPr>
-      <p:grpSpPr>
-        <a:xfrm>
-          <a:off x="0" y="0"/>
-          <a:ext cx="0" cy="0"/>
-          <a:chOff x="0" y="0"/>
-          <a:chExt cx="0" cy="0"/>
-        </a:xfrm>
-      </p:grpSpPr>
-      <p:sp>
-        <p:nvSpPr>
-          <p:cNvPr id="5" name="Titre 1"/>
-          <p:cNvSpPr txBox="1">
-            <a:spLocks/>
-          </p:cNvSpPr>
-          <p:nvPr/>
-        </p:nvSpPr>
-        <p:spPr>
-          <a:xfrm>
-            <a:off x="1766447" y="1061884"/>
-            <a:ext cx="8226490" cy="3083767"/>
-          </a:xfrm>
-          <a:prstGeom prst="rect">
-            <a:avLst/>
-          </a:prstGeom>
-        </p:spPr>
-        <p:txBody>
           <a:bodyPr vert="horz" lIns="91440" tIns="45720" rIns="91440" bIns="45720" rtlCol="0" anchor="b">
-            <a:normAutofit/>
+            <a:normAutofit fontScale="90000" lnSpcReduction="10000"/>
           </a:bodyPr>
           <a:lstStyle>
             <a:lvl1pPr algn="l" defTabSz="914400" rtl="0" eaLnBrk="1" latinLnBrk="0" hangingPunct="1">
@@ -5459,7 +5884,7 @@
                 <a:spcPct val="0"/>
               </a:spcBef>
               <a:buNone/>
-              <a:defRPr sz="5400" kern="1200">
+              <a:defRPr sz="3200" kern="1200">
                 <a:solidFill>
                   <a:schemeClr val="accent1"/>
                 </a:solidFill>
@@ -5470,14 +5895,9 @@
             </a:lvl1pPr>
           </a:lstStyle>
           <a:p>
-            <a:pPr algn="ctr"/>
-            <a:r>
-              <a:rPr lang="fr-FR" sz="8000" dirty="0">
-                <a:solidFill>
-                  <a:schemeClr val="tx1"/>
-                </a:solidFill>
-              </a:rPr>
-              <a:t>Merci</a:t>
+            <a:r>
+              <a:rPr lang="fr-FR" sz="3600" dirty="0"/>
+              <a:t>4 _ Evolution de l’application selon mon propre cahier des charges.</a:t>
             </a:r>
           </a:p>
         </p:txBody>
@@ -5485,7 +5905,7 @@
     </p:spTree>
     <p:extLst>
       <p:ext uri="{BB962C8B-B14F-4D97-AF65-F5344CB8AC3E}">
-        <p14:creationId xmlns:p14="http://schemas.microsoft.com/office/powerpoint/2010/main" val="3999759775"/>
+        <p14:creationId xmlns:p14="http://schemas.microsoft.com/office/powerpoint/2010/main" val="2288562025"/>
       </p:ext>
     </p:extLst>
   </p:cSld>
@@ -6284,6 +6704,17 @@
 </file>
 
 <file path=customXml/item2.xml><?xml version="1.0" encoding="utf-8"?>
+<p:properties xmlns:p="http://schemas.microsoft.com/office/2006/metadata/properties" xmlns:xsi="http://www.w3.org/2001/XMLSchema-instance" xmlns:pc="http://schemas.microsoft.com/office/infopath/2007/PartnerControls">
+  <documentManagement>
+    <VSO_x0020_item_x0020_id xmlns="40262f94-9f35-4ac3-9a90-690165a166b7" xsi:nil="true"/>
+    <Assetid_x0020_ xmlns="40262f94-9f35-4ac3-9a90-690165a166b7" xsi:nil="true"/>
+    <Item_x0020_Details xmlns="40262f94-9f35-4ac3-9a90-690165a166b7" xsi:nil="true"/>
+    <Template_x0020_details xmlns="40262f94-9f35-4ac3-9a90-690165a166b7" xsi:nil="true"/>
+  </documentManagement>
+</p:properties>
+</file>
+
+<file path=customXml/item3.xml><?xml version="1.0" encoding="utf-8"?>
 <ct:contentTypeSchema xmlns:ct="http://schemas.microsoft.com/office/2006/metadata/contentType" xmlns:ma="http://schemas.microsoft.com/office/2006/metadata/properties/metaAttributes" ct:_="" ma:_="" ma:contentTypeName="Document" ma:contentTypeID="0x010100AA3F7D94069FF64A86F7DFF56D60E3BE" ma:contentTypeVersion="6" ma:contentTypeDescription="Create a new document." ma:contentTypeScope="" ma:versionID="c32302c77d4085ecf495bdddb7f5e889">
   <xsd:schema xmlns:xsd="http://www.w3.org/2001/XMLSchema" xmlns:xs="http://www.w3.org/2001/XMLSchema" xmlns:p="http://schemas.microsoft.com/office/2006/metadata/properties" xmlns:ns2="a4f35948-e619-41b3-aa29-22878b09cfd2" xmlns:ns3="40262f94-9f35-4ac3-9a90-690165a166b7" targetNamespace="http://schemas.microsoft.com/office/2006/metadata/properties" ma:root="true" ma:fieldsID="4ab5ae46be95f9d0be6107e8200be7a2" ns2:_="" ns3:_="">
     <xsd:import namespace="a4f35948-e619-41b3-aa29-22878b09cfd2"/>
@@ -6464,17 +6895,6 @@
 </ct:contentTypeSchema>
 </file>
 
-<file path=customXml/item3.xml><?xml version="1.0" encoding="utf-8"?>
-<p:properties xmlns:p="http://schemas.microsoft.com/office/2006/metadata/properties" xmlns:xsi="http://www.w3.org/2001/XMLSchema-instance" xmlns:pc="http://schemas.microsoft.com/office/infopath/2007/PartnerControls">
-  <documentManagement>
-    <VSO_x0020_item_x0020_id xmlns="40262f94-9f35-4ac3-9a90-690165a166b7" xsi:nil="true"/>
-    <Assetid_x0020_ xmlns="40262f94-9f35-4ac3-9a90-690165a166b7" xsi:nil="true"/>
-    <Item_x0020_Details xmlns="40262f94-9f35-4ac3-9a90-690165a166b7" xsi:nil="true"/>
-    <Template_x0020_details xmlns="40262f94-9f35-4ac3-9a90-690165a166b7" xsi:nil="true"/>
-  </documentManagement>
-</p:properties>
-</file>
-
 <file path=customXml/itemProps1.xml><?xml version="1.0" encoding="utf-8"?>
 <ds:datastoreItem xmlns:ds="http://schemas.openxmlformats.org/officeDocument/2006/customXml" ds:itemID="{31C05A15-2C36-4B2C-9ED7-7313D59409A3}">
   <ds:schemaRefs>
@@ -6484,6 +6904,23 @@
 </file>
 
 <file path=customXml/itemProps2.xml><?xml version="1.0" encoding="utf-8"?>
+<ds:datastoreItem xmlns:ds="http://schemas.openxmlformats.org/officeDocument/2006/customXml" ds:itemID="{85A16170-AED4-43FB-90C7-1F1653EBFACC}">
+  <ds:schemaRefs>
+    <ds:schemaRef ds:uri="http://www.w3.org/XML/1998/namespace"/>
+    <ds:schemaRef ds:uri="http://purl.org/dc/dcmitype/"/>
+    <ds:schemaRef ds:uri="http://schemas.microsoft.com/office/2006/metadata/properties"/>
+    <ds:schemaRef ds:uri="http://purl.org/dc/terms/"/>
+    <ds:schemaRef ds:uri="http://schemas.microsoft.com/office/2006/documentManagement/types"/>
+    <ds:schemaRef ds:uri="http://schemas.microsoft.com/office/infopath/2007/PartnerControls"/>
+    <ds:schemaRef ds:uri="http://schemas.openxmlformats.org/package/2006/metadata/core-properties"/>
+    <ds:schemaRef ds:uri="40262f94-9f35-4ac3-9a90-690165a166b7"/>
+    <ds:schemaRef ds:uri="a4f35948-e619-41b3-aa29-22878b09cfd2"/>
+    <ds:schemaRef ds:uri="http://purl.org/dc/elements/1.1/"/>
+  </ds:schemaRefs>
+</ds:datastoreItem>
+</file>
+
+<file path=customXml/itemProps3.xml><?xml version="1.0" encoding="utf-8"?>
 <ds:datastoreItem xmlns:ds="http://schemas.openxmlformats.org/officeDocument/2006/customXml" ds:itemID="{2961EA76-1630-4788-A629-8FDAFC920575}">
   <ds:schemaRefs>
     <ds:schemaRef ds:uri="http://schemas.microsoft.com/office/2006/metadata/contentType"/>
@@ -6500,21 +6937,4 @@
     <ds:schemaRef ds:uri="http://schemas.microsoft.com/internal/obd"/>
   </ds:schemaRefs>
 </ds:datastoreItem>
-</file>
-
-<file path=customXml/itemProps3.xml><?xml version="1.0" encoding="utf-8"?>
-<ds:datastoreItem xmlns:ds="http://schemas.openxmlformats.org/officeDocument/2006/customXml" ds:itemID="{85A16170-AED4-43FB-90C7-1F1653EBFACC}">
-  <ds:schemaRefs>
-    <ds:schemaRef ds:uri="http://www.w3.org/XML/1998/namespace"/>
-    <ds:schemaRef ds:uri="http://purl.org/dc/dcmitype/"/>
-    <ds:schemaRef ds:uri="http://schemas.microsoft.com/office/2006/metadata/properties"/>
-    <ds:schemaRef ds:uri="http://purl.org/dc/terms/"/>
-    <ds:schemaRef ds:uri="http://schemas.microsoft.com/office/2006/documentManagement/types"/>
-    <ds:schemaRef ds:uri="http://schemas.microsoft.com/office/infopath/2007/PartnerControls"/>
-    <ds:schemaRef ds:uri="http://schemas.openxmlformats.org/package/2006/metadata/core-properties"/>
-    <ds:schemaRef ds:uri="40262f94-9f35-4ac3-9a90-690165a166b7"/>
-    <ds:schemaRef ds:uri="a4f35948-e619-41b3-aa29-22878b09cfd2"/>
-    <ds:schemaRef ds:uri="http://purl.org/dc/elements/1.1/"/>
-  </ds:schemaRefs>
-</ds:datastoreItem>
 </file>
</xml_diff>